<commit_message>
Adding fuzzy seeding statistics, improved scripts, bug fixes
</commit_message>
<xml_diff>
--- a/test/figures/read_mapping/read_mapping.pptx
+++ b/test/figures/read_mapping/read_mapping.pptx
@@ -199,7 +199,7 @@
           <a:p>
             <a:fld id="{52D9FB99-33AF-45C7-9798-F9BB105B9B87}" type="datetimeFigureOut">
               <a:rPr lang="en-US" smtClean="0"/>
-              <a:t>10/31/22</a:t>
+              <a:t>11/4/22</a:t>
             </a:fld>
             <a:endParaRPr lang="en-US"/>
           </a:p>
@@ -515,6 +515,10 @@
           <a:bodyPr/>
           <a:lstStyle/>
           <a:p>
+            <a:r>
+              <a:rPr lang="en-US" dirty="0" err="1"/>
+              <a:t>read_mapping.pdf</a:t>
+            </a:r>
             <a:endParaRPr lang="en-US" dirty="0"/>
           </a:p>
         </p:txBody>
@@ -604,6 +608,30 @@
           <a:bodyPr/>
           <a:lstStyle/>
           <a:p>
+            <a:pPr marL="0" marR="0" lvl="0" indent="0" algn="l" defTabSz="914400" rtl="0" eaLnBrk="1" fontAlgn="auto" latinLnBrk="0" hangingPunct="1">
+              <a:lnSpc>
+                <a:spcPct val="100000"/>
+              </a:lnSpc>
+              <a:spcBef>
+                <a:spcPts val="0"/>
+              </a:spcBef>
+              <a:spcAft>
+                <a:spcPts val="0"/>
+              </a:spcAft>
+              <a:buClrTx/>
+              <a:buSzTx/>
+              <a:buFontTx/>
+              <a:buNone/>
+              <a:tabLst/>
+              <a:defRPr/>
+            </a:pPr>
+            <a:r>
+              <a:rPr lang="en-US" dirty="0" err="1"/>
+              <a:t>read_mapping_blend.pdf</a:t>
+            </a:r>
+            <a:endParaRPr lang="en-US" dirty="0"/>
+          </a:p>
+          <a:p>
             <a:endParaRPr lang="en-US" dirty="0"/>
           </a:p>
         </p:txBody>
@@ -692,6 +720,30 @@
         <p:txBody>
           <a:bodyPr/>
           <a:lstStyle/>
+          <a:p>
+            <a:pPr marL="0" marR="0" lvl="0" indent="0" algn="l" defTabSz="914400" rtl="0" eaLnBrk="1" fontAlgn="auto" latinLnBrk="0" hangingPunct="1">
+              <a:lnSpc>
+                <a:spcPct val="100000"/>
+              </a:lnSpc>
+              <a:spcBef>
+                <a:spcPts val="0"/>
+              </a:spcBef>
+              <a:spcAft>
+                <a:spcPts val="0"/>
+              </a:spcAft>
+              <a:buClrTx/>
+              <a:buSzTx/>
+              <a:buFontTx/>
+              <a:buNone/>
+              <a:tabLst/>
+              <a:defRPr/>
+            </a:pPr>
+            <a:r>
+              <a:rPr lang="en-US" dirty="0" err="1"/>
+              <a:t>read_mapping_eq.pdf</a:t>
+            </a:r>
+            <a:endParaRPr lang="en-US" dirty="0"/>
+          </a:p>
           <a:p>
             <a:endParaRPr lang="en-US" dirty="0"/>
           </a:p>
@@ -864,7 +916,7 @@
           <a:p>
             <a:fld id="{E3A9BCBE-8A83-4E67-B3B6-D6A7A53377E1}" type="datetimeFigureOut">
               <a:rPr lang="en-US" smtClean="0"/>
-              <a:t>10/31/22</a:t>
+              <a:t>11/4/22</a:t>
             </a:fld>
             <a:endParaRPr lang="en-US"/>
           </a:p>
@@ -1034,7 +1086,7 @@
           <a:p>
             <a:fld id="{E3A9BCBE-8A83-4E67-B3B6-D6A7A53377E1}" type="datetimeFigureOut">
               <a:rPr lang="en-US" smtClean="0"/>
-              <a:t>10/31/22</a:t>
+              <a:t>11/4/22</a:t>
             </a:fld>
             <a:endParaRPr lang="en-US"/>
           </a:p>
@@ -1214,7 +1266,7 @@
           <a:p>
             <a:fld id="{E3A9BCBE-8A83-4E67-B3B6-D6A7A53377E1}" type="datetimeFigureOut">
               <a:rPr lang="en-US" smtClean="0"/>
-              <a:t>10/31/22</a:t>
+              <a:t>11/4/22</a:t>
             </a:fld>
             <a:endParaRPr lang="en-US"/>
           </a:p>
@@ -1384,7 +1436,7 @@
           <a:p>
             <a:fld id="{E3A9BCBE-8A83-4E67-B3B6-D6A7A53377E1}" type="datetimeFigureOut">
               <a:rPr lang="en-US" smtClean="0"/>
-              <a:t>10/31/22</a:t>
+              <a:t>11/4/22</a:t>
             </a:fld>
             <a:endParaRPr lang="en-US"/>
           </a:p>
@@ -1630,7 +1682,7 @@
           <a:p>
             <a:fld id="{E3A9BCBE-8A83-4E67-B3B6-D6A7A53377E1}" type="datetimeFigureOut">
               <a:rPr lang="en-US" smtClean="0"/>
-              <a:t>10/31/22</a:t>
+              <a:t>11/4/22</a:t>
             </a:fld>
             <a:endParaRPr lang="en-US"/>
           </a:p>
@@ -1862,7 +1914,7 @@
           <a:p>
             <a:fld id="{E3A9BCBE-8A83-4E67-B3B6-D6A7A53377E1}" type="datetimeFigureOut">
               <a:rPr lang="en-US" smtClean="0"/>
-              <a:t>10/31/22</a:t>
+              <a:t>11/4/22</a:t>
             </a:fld>
             <a:endParaRPr lang="en-US"/>
           </a:p>
@@ -2229,7 +2281,7 @@
           <a:p>
             <a:fld id="{E3A9BCBE-8A83-4E67-B3B6-D6A7A53377E1}" type="datetimeFigureOut">
               <a:rPr lang="en-US" smtClean="0"/>
-              <a:t>10/31/22</a:t>
+              <a:t>11/4/22</a:t>
             </a:fld>
             <a:endParaRPr lang="en-US"/>
           </a:p>
@@ -2347,7 +2399,7 @@
           <a:p>
             <a:fld id="{E3A9BCBE-8A83-4E67-B3B6-D6A7A53377E1}" type="datetimeFigureOut">
               <a:rPr lang="en-US" smtClean="0"/>
-              <a:t>10/31/22</a:t>
+              <a:t>11/4/22</a:t>
             </a:fld>
             <a:endParaRPr lang="en-US"/>
           </a:p>
@@ -2442,7 +2494,7 @@
           <a:p>
             <a:fld id="{E3A9BCBE-8A83-4E67-B3B6-D6A7A53377E1}" type="datetimeFigureOut">
               <a:rPr lang="en-US" smtClean="0"/>
-              <a:t>10/31/22</a:t>
+              <a:t>11/4/22</a:t>
             </a:fld>
             <a:endParaRPr lang="en-US"/>
           </a:p>
@@ -2719,7 +2771,7 @@
           <a:p>
             <a:fld id="{E3A9BCBE-8A83-4E67-B3B6-D6A7A53377E1}" type="datetimeFigureOut">
               <a:rPr lang="en-US" smtClean="0"/>
-              <a:t>10/31/22</a:t>
+              <a:t>11/4/22</a:t>
             </a:fld>
             <a:endParaRPr lang="en-US"/>
           </a:p>
@@ -2976,7 +3028,7 @@
           <a:p>
             <a:fld id="{E3A9BCBE-8A83-4E67-B3B6-D6A7A53377E1}" type="datetimeFigureOut">
               <a:rPr lang="en-US" smtClean="0"/>
-              <a:t>10/31/22</a:t>
+              <a:t>11/4/22</a:t>
             </a:fld>
             <a:endParaRPr lang="en-US"/>
           </a:p>
@@ -3189,7 +3241,7 @@
           <a:p>
             <a:fld id="{E3A9BCBE-8A83-4E67-B3B6-D6A7A53377E1}" type="datetimeFigureOut">
               <a:rPr lang="en-US" smtClean="0"/>
-              <a:t>10/31/22</a:t>
+              <a:t>11/4/22</a:t>
             </a:fld>
             <a:endParaRPr lang="en-US"/>
           </a:p>
@@ -4014,14 +4066,13 @@
               </a:ext>
             </a:extLst>
           </a:blip>
-          <a:stretch>
-            <a:fillRect/>
-          </a:stretch>
+          <a:srcRect/>
+          <a:stretch/>
         </p:blipFill>
         <p:spPr>
           <a:xfrm>
             <a:off x="2436989" y="511053"/>
-            <a:ext cx="13295522" cy="5113662"/>
+            <a:ext cx="13295521" cy="5113661"/>
           </a:xfrm>
           <a:prstGeom prst="rect">
             <a:avLst/>

</xml_diff>